<commit_message>
bib from science draft. New figure of k-magnitudes example
</commit_message>
<xml_diff>
--- a/Appendices/SD_030_example_distances.pptx
+++ b/Appendices/SD_030_example_distances.pptx
@@ -289,7 +289,7 @@
           <a:p>
             <a:fld id="{552D1098-5542-4C00-80F8-968512A25559}" type="datetimeFigureOut">
               <a:rPr lang="es-ES" smtClean="0"/>
-              <a:t>20/01/2016</a:t>
+              <a:t>09/04/2016</a:t>
             </a:fld>
             <a:endParaRPr lang="es-ES"/>
           </a:p>
@@ -459,7 +459,7 @@
           <a:p>
             <a:fld id="{552D1098-5542-4C00-80F8-968512A25559}" type="datetimeFigureOut">
               <a:rPr lang="es-ES" smtClean="0"/>
-              <a:t>20/01/2016</a:t>
+              <a:t>09/04/2016</a:t>
             </a:fld>
             <a:endParaRPr lang="es-ES"/>
           </a:p>
@@ -639,7 +639,7 @@
           <a:p>
             <a:fld id="{552D1098-5542-4C00-80F8-968512A25559}" type="datetimeFigureOut">
               <a:rPr lang="es-ES" smtClean="0"/>
-              <a:t>20/01/2016</a:t>
+              <a:t>09/04/2016</a:t>
             </a:fld>
             <a:endParaRPr lang="es-ES"/>
           </a:p>
@@ -809,7 +809,7 @@
           <a:p>
             <a:fld id="{552D1098-5542-4C00-80F8-968512A25559}" type="datetimeFigureOut">
               <a:rPr lang="es-ES" smtClean="0"/>
-              <a:t>20/01/2016</a:t>
+              <a:t>09/04/2016</a:t>
             </a:fld>
             <a:endParaRPr lang="es-ES"/>
           </a:p>
@@ -1055,7 +1055,7 @@
           <a:p>
             <a:fld id="{552D1098-5542-4C00-80F8-968512A25559}" type="datetimeFigureOut">
               <a:rPr lang="es-ES" smtClean="0"/>
-              <a:t>20/01/2016</a:t>
+              <a:t>09/04/2016</a:t>
             </a:fld>
             <a:endParaRPr lang="es-ES"/>
           </a:p>
@@ -1343,7 +1343,7 @@
           <a:p>
             <a:fld id="{552D1098-5542-4C00-80F8-968512A25559}" type="datetimeFigureOut">
               <a:rPr lang="es-ES" smtClean="0"/>
-              <a:t>20/01/2016</a:t>
+              <a:t>09/04/2016</a:t>
             </a:fld>
             <a:endParaRPr lang="es-ES"/>
           </a:p>
@@ -1770,7 +1770,7 @@
           <a:p>
             <a:fld id="{552D1098-5542-4C00-80F8-968512A25559}" type="datetimeFigureOut">
               <a:rPr lang="es-ES" smtClean="0"/>
-              <a:t>20/01/2016</a:t>
+              <a:t>09/04/2016</a:t>
             </a:fld>
             <a:endParaRPr lang="es-ES"/>
           </a:p>
@@ -1888,7 +1888,7 @@
           <a:p>
             <a:fld id="{552D1098-5542-4C00-80F8-968512A25559}" type="datetimeFigureOut">
               <a:rPr lang="es-ES" smtClean="0"/>
-              <a:t>20/01/2016</a:t>
+              <a:t>09/04/2016</a:t>
             </a:fld>
             <a:endParaRPr lang="es-ES"/>
           </a:p>
@@ -1983,7 +1983,7 @@
           <a:p>
             <a:fld id="{552D1098-5542-4C00-80F8-968512A25559}" type="datetimeFigureOut">
               <a:rPr lang="es-ES" smtClean="0"/>
-              <a:t>20/01/2016</a:t>
+              <a:t>09/04/2016</a:t>
             </a:fld>
             <a:endParaRPr lang="es-ES"/>
           </a:p>
@@ -2260,7 +2260,7 @@
           <a:p>
             <a:fld id="{552D1098-5542-4C00-80F8-968512A25559}" type="datetimeFigureOut">
               <a:rPr lang="es-ES" smtClean="0"/>
-              <a:t>20/01/2016</a:t>
+              <a:t>09/04/2016</a:t>
             </a:fld>
             <a:endParaRPr lang="es-ES"/>
           </a:p>
@@ -2513,7 +2513,7 @@
           <a:p>
             <a:fld id="{552D1098-5542-4C00-80F8-968512A25559}" type="datetimeFigureOut">
               <a:rPr lang="es-ES" smtClean="0"/>
-              <a:t>20/01/2016</a:t>
+              <a:t>09/04/2016</a:t>
             </a:fld>
             <a:endParaRPr lang="es-ES"/>
           </a:p>
@@ -2726,7 +2726,7 @@
           <a:p>
             <a:fld id="{552D1098-5542-4C00-80F8-968512A25559}" type="datetimeFigureOut">
               <a:rPr lang="es-ES" smtClean="0"/>
-              <a:t>20/01/2016</a:t>
+              <a:t>09/04/2016</a:t>
             </a:fld>
             <a:endParaRPr lang="es-ES"/>
           </a:p>
@@ -4945,6 +4945,7 @@
                 <a:lumMod val="50000"/>
               </a:schemeClr>
             </a:solidFill>
+            <a:prstDash val="dashDot"/>
           </a:ln>
         </p:spPr>
         <p:style>
@@ -4985,6 +4986,7 @@
                 <a:lumMod val="50000"/>
               </a:schemeClr>
             </a:solidFill>
+            <a:prstDash val="dashDot"/>
           </a:ln>
         </p:spPr>
         <p:style>
@@ -5020,10 +5022,7 @@
           </a:prstGeom>
           <a:ln w="19050">
             <a:solidFill>
-              <a:schemeClr val="tx2">
-                <a:lumMod val="60000"/>
-                <a:lumOff val="40000"/>
-              </a:schemeClr>
+              <a:srgbClr val="00B050"/>
             </a:solidFill>
           </a:ln>
         </p:spPr>
@@ -5065,6 +5064,7 @@
                 <a:lumMod val="50000"/>
               </a:schemeClr>
             </a:solidFill>
+            <a:prstDash val="dashDot"/>
           </a:ln>
         </p:spPr>
         <p:style>
@@ -5105,6 +5105,7 @@
                 <a:lumMod val="50000"/>
               </a:schemeClr>
             </a:solidFill>
+            <a:prstDash val="dashDot"/>
           </a:ln>
         </p:spPr>
         <p:style>
@@ -5137,10 +5138,7 @@
             <a:avLst/>
           </a:prstGeom>
           <a:solidFill>
-            <a:schemeClr val="accent2">
-              <a:lumMod val="20000"/>
-              <a:lumOff val="80000"/>
-            </a:schemeClr>
+            <a:srgbClr val="FCF6F6"/>
           </a:solidFill>
           <a:ln>
             <a:solidFill>
@@ -5266,10 +5264,7 @@
             <a:avLst/>
           </a:prstGeom>
           <a:solidFill>
-            <a:schemeClr val="accent2">
-              <a:lumMod val="20000"/>
-              <a:lumOff val="80000"/>
-            </a:schemeClr>
+            <a:srgbClr val="FCF6F6"/>
           </a:solidFill>
           <a:ln>
             <a:solidFill>
@@ -5395,10 +5390,7 @@
             <a:avLst/>
           </a:prstGeom>
           <a:solidFill>
-            <a:schemeClr val="accent2">
-              <a:lumMod val="20000"/>
-              <a:lumOff val="80000"/>
-            </a:schemeClr>
+            <a:srgbClr val="FCF6F6"/>
           </a:solidFill>
           <a:ln>
             <a:solidFill>
@@ -5524,10 +5516,7 @@
             <a:avLst/>
           </a:prstGeom>
           <a:solidFill>
-            <a:schemeClr val="accent2">
-              <a:lumMod val="20000"/>
-              <a:lumOff val="80000"/>
-            </a:schemeClr>
+            <a:srgbClr val="FCF6F6"/>
           </a:solidFill>
           <a:ln>
             <a:solidFill>
@@ -6045,7 +6034,7 @@
         </p:nvSpPr>
         <p:spPr>
           <a:xfrm>
-            <a:off x="467544" y="332656"/>
+            <a:off x="395536" y="332656"/>
             <a:ext cx="8496944" cy="3960440"/>
           </a:xfrm>
           <a:prstGeom prst="rect">
@@ -6194,6 +6183,7 @@
                 <a:lumMod val="50000"/>
               </a:schemeClr>
             </a:solidFill>
+            <a:prstDash val="dashDot"/>
           </a:ln>
         </p:spPr>
         <p:style>
@@ -6234,6 +6224,7 @@
                 <a:lumMod val="50000"/>
               </a:schemeClr>
             </a:solidFill>
+            <a:prstDash val="dashDot"/>
           </a:ln>
         </p:spPr>
         <p:style>
@@ -6258,9 +6249,9 @@
           <p:nvPr/>
         </p:nvSpPr>
         <p:spPr>
-          <a:xfrm rot="3583465">
-            <a:off x="650620" y="4372072"/>
-            <a:ext cx="1532926" cy="369332"/>
+          <a:xfrm>
+            <a:off x="88484" y="4802288"/>
+            <a:ext cx="1952337" cy="369332"/>
           </a:xfrm>
           <a:prstGeom prst="rect">
             <a:avLst/>
@@ -6274,7 +6265,7 @@
           <a:lstStyle/>
           <a:p>
             <a:r>
-              <a:rPr lang="es-ES" dirty="0" err="1" smtClean="0">
+              <a:rPr lang="es-ES" b="1" dirty="0" err="1" smtClean="0">
                 <a:solidFill>
                   <a:schemeClr val="tx2">
                     <a:lumMod val="75000"/>
@@ -6284,7 +6275,7 @@
               <a:t>dist</a:t>
             </a:r>
             <a:r>
-              <a:rPr lang="es-ES" dirty="0" smtClean="0">
+              <a:rPr lang="es-ES" b="1" dirty="0" smtClean="0">
                 <a:solidFill>
                   <a:schemeClr val="tx2">
                     <a:lumMod val="75000"/>
@@ -6294,7 +6285,7 @@
               <a:t> </a:t>
             </a:r>
             <a:r>
-              <a:rPr lang="es-ES" b="1" baseline="-25000" dirty="0" smtClean="0">
+              <a:rPr lang="es-ES" sz="2400" b="1" i="1" baseline="-25000" dirty="0" smtClean="0">
                 <a:solidFill>
                   <a:schemeClr val="tx2">
                     <a:lumMod val="75000"/>
@@ -6304,7 +6295,7 @@
               <a:t>pl4_disp1</a:t>
             </a:r>
             <a:r>
-              <a:rPr lang="es-ES" dirty="0" smtClean="0">
+              <a:rPr lang="es-ES" b="1" dirty="0" smtClean="0">
                 <a:solidFill>
                   <a:schemeClr val="tx2">
                     <a:lumMod val="75000"/>
@@ -6313,7 +6304,7 @@
               </a:rPr>
               <a:t> = 1</a:t>
             </a:r>
-            <a:endParaRPr lang="es-ES" dirty="0">
+            <a:endParaRPr lang="es-ES" b="1" dirty="0">
               <a:solidFill>
                 <a:schemeClr val="tx2">
                   <a:lumMod val="75000"/>
@@ -6337,7 +6328,11 @@
           <a:prstGeom prst="line">
             <a:avLst/>
           </a:prstGeom>
-          <a:ln w="28575"/>
+          <a:ln w="28575">
+            <a:solidFill>
+              <a:srgbClr val="00B050"/>
+            </a:solidFill>
+          </a:ln>
         </p:spPr>
         <p:style>
           <a:lnRef idx="1">
@@ -6371,6 +6366,9 @@
             <a:avLst/>
           </a:prstGeom>
           <a:ln w="12700">
+            <a:solidFill>
+              <a:srgbClr val="00B050"/>
+            </a:solidFill>
             <a:prstDash val="sysDot"/>
           </a:ln>
         </p:spPr>
@@ -6396,9 +6394,9 @@
           <p:nvPr/>
         </p:nvSpPr>
         <p:spPr>
-          <a:xfrm rot="19191071">
-            <a:off x="1152749" y="2005863"/>
-            <a:ext cx="1532926" cy="369332"/>
+          <a:xfrm>
+            <a:off x="798213" y="1761150"/>
+            <a:ext cx="1851470" cy="369332"/>
           </a:xfrm>
           <a:prstGeom prst="rect">
             <a:avLst/>
@@ -6412,55 +6410,40 @@
           <a:lstStyle/>
           <a:p>
             <a:r>
-              <a:rPr lang="es-ES" dirty="0" err="1" smtClean="0">
-                <a:solidFill>
-                  <a:schemeClr val="tx2">
-                    <a:lumMod val="60000"/>
-                    <a:lumOff val="40000"/>
-                  </a:schemeClr>
+              <a:rPr lang="es-ES" b="1" dirty="0" err="1" smtClean="0">
+                <a:solidFill>
+                  <a:srgbClr val="00B050"/>
                 </a:solidFill>
               </a:rPr>
               <a:t>dist</a:t>
             </a:r>
             <a:r>
-              <a:rPr lang="es-ES" dirty="0" smtClean="0">
-                <a:solidFill>
-                  <a:schemeClr val="tx2">
-                    <a:lumMod val="60000"/>
-                    <a:lumOff val="40000"/>
-                  </a:schemeClr>
+              <a:rPr lang="es-ES" b="1" dirty="0" smtClean="0">
+                <a:solidFill>
+                  <a:srgbClr val="00B050"/>
                 </a:solidFill>
               </a:rPr>
               <a:t> </a:t>
             </a:r>
             <a:r>
-              <a:rPr lang="es-ES" b="1" baseline="-25000" dirty="0" smtClean="0">
-                <a:solidFill>
-                  <a:schemeClr val="tx2">
-                    <a:lumMod val="60000"/>
-                    <a:lumOff val="40000"/>
-                  </a:schemeClr>
+              <a:rPr lang="es-ES" sz="2400" b="1" i="1" baseline="-25000" dirty="0" smtClean="0">
+                <a:solidFill>
+                  <a:srgbClr val="00B050"/>
                 </a:solidFill>
               </a:rPr>
               <a:t>pl4_disp2</a:t>
             </a:r>
             <a:r>
-              <a:rPr lang="es-ES" dirty="0" smtClean="0">
-                <a:solidFill>
-                  <a:schemeClr val="tx2">
-                    <a:lumMod val="60000"/>
-                    <a:lumOff val="40000"/>
-                  </a:schemeClr>
+              <a:rPr lang="es-ES" b="1" dirty="0" smtClean="0">
+                <a:solidFill>
+                  <a:srgbClr val="00B050"/>
                 </a:solidFill>
               </a:rPr>
               <a:t> = 3</a:t>
             </a:r>
-            <a:endParaRPr lang="es-ES" dirty="0">
+            <a:endParaRPr lang="es-ES" b="1" dirty="0">
               <a:solidFill>
-                <a:schemeClr val="tx2">
-                  <a:lumMod val="60000"/>
-                  <a:lumOff val="40000"/>
-                </a:schemeClr>
+                <a:srgbClr val="00B050"/>
               </a:solidFill>
             </a:endParaRPr>
           </a:p>
@@ -6622,9 +6605,9 @@
           <p:nvPr/>
         </p:nvSpPr>
         <p:spPr>
-          <a:xfrm rot="1595441">
-            <a:off x="3122648" y="2130316"/>
-            <a:ext cx="1736756" cy="369332"/>
+          <a:xfrm rot="152299">
+            <a:off x="4645222" y="2242153"/>
+            <a:ext cx="1813018" cy="369332"/>
           </a:xfrm>
           <a:prstGeom prst="rect">
             <a:avLst/>
@@ -6638,7 +6621,7 @@
           <a:lstStyle/>
           <a:p>
             <a:r>
-              <a:rPr lang="es-ES" dirty="0" err="1" smtClean="0">
+              <a:rPr lang="es-ES" b="1" dirty="0" err="1" smtClean="0">
                 <a:solidFill>
                   <a:schemeClr val="accent4">
                     <a:lumMod val="75000"/>
@@ -6648,7 +6631,7 @@
               <a:t>dist</a:t>
             </a:r>
             <a:r>
-              <a:rPr lang="es-ES" dirty="0" smtClean="0">
+              <a:rPr lang="es-ES" b="1" dirty="0" smtClean="0">
                 <a:solidFill>
                   <a:schemeClr val="accent4">
                     <a:lumMod val="75000"/>
@@ -6658,7 +6641,7 @@
               <a:t> </a:t>
             </a:r>
             <a:r>
-              <a:rPr lang="es-ES" b="1" baseline="-25000" dirty="0" smtClean="0">
+              <a:rPr lang="es-ES" sz="2400" b="1" i="1" baseline="-25000" dirty="0" smtClean="0">
                 <a:solidFill>
                   <a:schemeClr val="accent4">
                     <a:lumMod val="75000"/>
@@ -6668,7 +6651,7 @@
               <a:t>pl4_disp4</a:t>
             </a:r>
             <a:r>
-              <a:rPr lang="es-ES" dirty="0" smtClean="0">
+              <a:rPr lang="es-ES" b="1" dirty="0" smtClean="0">
                 <a:solidFill>
                   <a:schemeClr val="accent4">
                     <a:lumMod val="75000"/>
@@ -6677,7 +6660,7 @@
               </a:rPr>
               <a:t> = 3</a:t>
             </a:r>
-            <a:endParaRPr lang="es-ES" dirty="0">
+            <a:endParaRPr lang="es-ES" b="1" dirty="0">
               <a:solidFill>
                 <a:schemeClr val="accent4">
                   <a:lumMod val="75000"/>
@@ -6796,14 +6779,12 @@
       <p:cxnSp>
         <p:nvCxnSpPr>
           <p:cNvPr id="52" name="51 Conector recto"/>
-          <p:cNvCxnSpPr>
-            <a:endCxn id="10" idx="0"/>
-          </p:cNvCxnSpPr>
+          <p:cNvCxnSpPr/>
           <p:nvPr/>
         </p:nvCxnSpPr>
         <p:spPr>
           <a:xfrm>
-            <a:off x="3372216" y="1677191"/>
+            <a:off x="3414046" y="1677191"/>
             <a:ext cx="4275370" cy="1031729"/>
           </a:xfrm>
           <a:prstGeom prst="line">
@@ -6837,9 +6818,9 @@
           <p:nvPr/>
         </p:nvSpPr>
         <p:spPr>
-          <a:xfrm rot="715442">
-            <a:off x="5656374" y="2034597"/>
-            <a:ext cx="1653905" cy="369332"/>
+          <a:xfrm>
+            <a:off x="7024269" y="2017522"/>
+            <a:ext cx="1932663" cy="369332"/>
           </a:xfrm>
           <a:prstGeom prst="rect">
             <a:avLst/>
@@ -6853,7 +6834,7 @@
           <a:lstStyle/>
           <a:p>
             <a:r>
-              <a:rPr lang="es-ES" dirty="0" err="1" smtClean="0">
+              <a:rPr lang="es-ES" b="1" dirty="0" err="1" smtClean="0">
                 <a:solidFill>
                   <a:srgbClr val="FF0000"/>
                 </a:solidFill>
@@ -6861,7 +6842,7 @@
               <a:t>dist</a:t>
             </a:r>
             <a:r>
-              <a:rPr lang="es-ES" dirty="0" smtClean="0">
+              <a:rPr lang="es-ES" b="1" dirty="0" smtClean="0">
                 <a:solidFill>
                   <a:srgbClr val="FF0000"/>
                 </a:solidFill>
@@ -6869,7 +6850,7 @@
               <a:t> </a:t>
             </a:r>
             <a:r>
-              <a:rPr lang="es-ES" b="1" baseline="-25000" dirty="0" smtClean="0">
+              <a:rPr lang="es-ES" sz="2400" b="1" i="1" baseline="-25000" dirty="0" smtClean="0">
                 <a:solidFill>
                   <a:srgbClr val="FF0000"/>
                 </a:solidFill>
@@ -6877,14 +6858,14 @@
               <a:t>pl4_disp3</a:t>
             </a:r>
             <a:r>
-              <a:rPr lang="es-ES" dirty="0" smtClean="0">
+              <a:rPr lang="es-ES" b="1" dirty="0" smtClean="0">
                 <a:solidFill>
                   <a:srgbClr val="FF0000"/>
                 </a:solidFill>
               </a:rPr>
               <a:t> = 3</a:t>
             </a:r>
-            <a:endParaRPr lang="es-ES" dirty="0">
+            <a:endParaRPr lang="es-ES" b="1" dirty="0">
               <a:solidFill>
                 <a:srgbClr val="FF0000"/>
               </a:solidFill>
@@ -6900,8 +6881,8 @@
         </p:nvSpPr>
         <p:spPr>
           <a:xfrm>
-            <a:off x="5865772" y="4324454"/>
-            <a:ext cx="3960440" cy="369332"/>
+            <a:off x="2931062" y="6442013"/>
+            <a:ext cx="3960440" cy="379591"/>
           </a:xfrm>
           <a:prstGeom prst="rect">
             <a:avLst/>
@@ -6915,26 +6896,26 @@
           <a:lstStyle/>
           <a:p>
             <a:r>
-              <a:rPr lang="es-ES" dirty="0" err="1" smtClean="0"/>
+              <a:rPr lang="es-ES" b="1" dirty="0" err="1" smtClean="0"/>
               <a:t>K</a:t>
             </a:r>
             <a:r>
-              <a:rPr lang="es-ES" b="1" baseline="-25000" dirty="0" err="1" smtClean="0"/>
+              <a:rPr lang="es-ES" sz="2400" b="1" i="1" baseline="-25000" dirty="0" err="1" smtClean="0"/>
               <a:t>radius</a:t>
             </a:r>
             <a:r>
-              <a:rPr lang="es-ES" dirty="0" smtClean="0"/>
+              <a:rPr lang="es-ES" b="1" dirty="0" smtClean="0"/>
               <a:t> pl4 </a:t>
             </a:r>
             <a:r>
-              <a:rPr lang="es-ES" dirty="0"/>
+              <a:rPr lang="es-ES" b="1" dirty="0"/>
               <a:t>= </a:t>
             </a:r>
             <a:r>
-              <a:rPr lang="es-ES" dirty="0" smtClean="0"/>
+              <a:rPr lang="es-ES" b="1" dirty="0" smtClean="0"/>
               <a:t>(1+3+3+3)/4 = 2.5</a:t>
             </a:r>
-            <a:endParaRPr lang="es-ES" dirty="0"/>
+            <a:endParaRPr lang="es-ES" b="1" dirty="0"/>
           </a:p>
         </p:txBody>
       </p:sp>
@@ -7215,10 +7196,7 @@
           </a:prstGeom>
           <a:ln w="19050">
             <a:solidFill>
-              <a:schemeClr val="tx2">
-                <a:lumMod val="60000"/>
-                <a:lumOff val="40000"/>
-              </a:schemeClr>
+              <a:srgbClr val="00B050"/>
             </a:solidFill>
           </a:ln>
         </p:spPr>

</xml_diff>